<commit_message>
Change the Instructor Guide to 1.0.0 on first slide
</commit_message>
<xml_diff>
--- a/01-Introduction.pptx
+++ b/01-Introduction.pptx
@@ -246,7 +246,7 @@
                 <a:latin typeface="Arial" panose="020B0604020202020204" pitchFamily="34" charset="0"/>
                 <a:cs typeface="Arial" panose="020B0604020202020204" pitchFamily="34" charset="0"/>
               </a:rPr>
-              <a:t>2016-01-12</a:t>
+              <a:t>2016-02-03</a:t>
             </a:fld>
             <a:endParaRPr lang="en-US" dirty="0">
               <a:latin typeface="Arial" panose="020B0604020202020204" pitchFamily="34" charset="0"/>
@@ -1125,15 +1125,7 @@
           <a:p>
             <a:r>
               <a:rPr lang="en-US" sz="1300" dirty="0" smtClean="0"/>
-              <a:t>During that time we will install all the necessary tools on your workstation (your laptop</a:t>
-            </a:r>
-            <a:r>
-              <a:rPr lang="en-US" sz="1300" dirty="0" smtClean="0"/>
-              <a:t>) </a:t>
-            </a:r>
-            <a:r>
-              <a:rPr lang="en-US" sz="1300" dirty="0" smtClean="0"/>
-              <a:t>and troubleshoot any installation issues you may experience.</a:t>
+              <a:t>During that time we will install all the necessary tools on your workstation (your laptop) and troubleshoot any installation issues you may experience.</a:t>
             </a:r>
           </a:p>
           <a:p>
@@ -4028,7 +4020,7 @@
           <a:p>
             <a:pPr algn="ctr"/>
             <a:r>
-              <a:rPr lang="en-US" sz="1600" dirty="0">
+              <a:rPr lang="en-US" sz="1600">
                 <a:solidFill>
                   <a:srgbClr val="7D868C"/>
                 </a:solidFill>
@@ -4036,12 +4028,12 @@
               <a:t>Course </a:t>
             </a:r>
             <a:r>
-              <a:rPr lang="en-US" sz="1600" dirty="0" smtClean="0">
+              <a:rPr lang="en-US" sz="1600" smtClean="0">
                 <a:solidFill>
                   <a:srgbClr val="7D868C"/>
                 </a:solidFill>
               </a:rPr>
-              <a:t>v1.0.3</a:t>
+              <a:t>v1.0.0</a:t>
             </a:r>
             <a:endParaRPr lang="en-US" sz="1600" dirty="0">
               <a:solidFill>
@@ -5709,7 +5701,7 @@
             <a:noFill/>
             <a:extLst>
               <a:ext uri="{909E8E84-426E-40dd-AFC4-6F175D3DCCD1}">
-                <a14:hiddenFill xmlns="" xmlns:a14="http://schemas.microsoft.com/office/drawing/2010/main">
+                <a14:hiddenFill xmlns:a14="http://schemas.microsoft.com/office/drawing/2010/main" xmlns="">
                   <a:solidFill>
                     <a:srgbClr val="FFFFFF"/>
                   </a:solidFill>
@@ -5750,7 +5742,7 @@
             <a:noFill/>
             <a:extLst>
               <a:ext uri="{909E8E84-426E-40dd-AFC4-6F175D3DCCD1}">
-                <a14:hiddenFill xmlns="" xmlns:a14="http://schemas.microsoft.com/office/drawing/2010/main">
+                <a14:hiddenFill xmlns:a14="http://schemas.microsoft.com/office/drawing/2010/main" xmlns="">
                   <a:solidFill>
                     <a:srgbClr val="FFFFFF"/>
                   </a:solidFill>
@@ -5791,7 +5783,7 @@
             <a:noFill/>
             <a:extLst>
               <a:ext uri="{909E8E84-426E-40dd-AFC4-6F175D3DCCD1}">
-                <a14:hiddenFill xmlns="" xmlns:a14="http://schemas.microsoft.com/office/drawing/2010/main">
+                <a14:hiddenFill xmlns:a14="http://schemas.microsoft.com/office/drawing/2010/main" xmlns="">
                   <a:solidFill>
                     <a:srgbClr val="FFFFFF"/>
                   </a:solidFill>
@@ -5915,7 +5907,7 @@
           <a:noFill/>
           <a:extLst>
             <a:ext uri="{909E8E84-426E-40dd-AFC4-6F175D3DCCD1}">
-              <a14:hiddenFill xmlns="" xmlns:a14="http://schemas.microsoft.com/office/drawing/2010/main">
+              <a14:hiddenFill xmlns:a14="http://schemas.microsoft.com/office/drawing/2010/main" xmlns="">
                 <a:solidFill>
                   <a:srgbClr val="FFFFFF"/>
                 </a:solidFill>
@@ -6819,11 +6811,7 @@
           <a:p>
             <a:r>
               <a:rPr lang="en-US" sz="3733" dirty="0" smtClean="0"/>
-              <a:t>We </a:t>
-            </a:r>
-            <a:r>
-              <a:rPr lang="en-US" sz="3733" dirty="0" smtClean="0"/>
-              <a:t>need </a:t>
+              <a:t>We need </a:t>
             </a:r>
             <a:r>
               <a:rPr lang="en-US" sz="3733" dirty="0"/>
@@ -6869,7 +6857,6 @@
               <a:rPr lang="de-DE" sz="3200" dirty="0" smtClean="0"/>
               <a:t>git (optional)</a:t>
             </a:r>
-            <a:endParaRPr lang="de-DE" sz="3200" dirty="0" smtClean="0"/>
           </a:p>
           <a:p>
             <a:pPr marL="766214" lvl="1" indent="-457189">
@@ -7385,7 +7372,6 @@
               <a:rPr lang="en-US" sz="4000" dirty="0"/>
               <a:t> to connect to the remote workstation.</a:t>
             </a:r>
-            <a:endParaRPr lang="en-US" sz="4000" dirty="0"/>
           </a:p>
         </p:txBody>
       </p:sp>

</xml_diff>